<commit_message>
adding project first draft data
</commit_message>
<xml_diff>
--- a/Notes on MetroMetric.pptx
+++ b/Notes on MetroMetric.pptx
@@ -7,10 +7,18 @@
   <p:sldIdLst>
     <p:sldId id="256" r:id="rId2"/>
     <p:sldId id="257" r:id="rId3"/>
-    <p:sldId id="260" r:id="rId4"/>
-    <p:sldId id="261" r:id="rId5"/>
-    <p:sldId id="259" r:id="rId6"/>
-    <p:sldId id="258" r:id="rId7"/>
+    <p:sldId id="262" r:id="rId4"/>
+    <p:sldId id="260" r:id="rId5"/>
+    <p:sldId id="269" r:id="rId6"/>
+    <p:sldId id="263" r:id="rId7"/>
+    <p:sldId id="261" r:id="rId8"/>
+    <p:sldId id="265" r:id="rId9"/>
+    <p:sldId id="264" r:id="rId10"/>
+    <p:sldId id="259" r:id="rId11"/>
+    <p:sldId id="266" r:id="rId12"/>
+    <p:sldId id="268" r:id="rId13"/>
+    <p:sldId id="267" r:id="rId14"/>
+    <p:sldId id="258" r:id="rId15"/>
   </p:sldIdLst>
   <p:sldSz cx="9144000" cy="6858000" type="screen4x3"/>
   <p:notesSz cx="6858000" cy="9144000"/>
@@ -294,7 +302,7 @@
             <a:fld id="{1D8BD707-D9CF-40AE-B4C6-C98DA3205C09}" type="datetimeFigureOut">
               <a:rPr lang="en-US" smtClean="0"/>
               <a:pPr/>
-              <a:t>2/21/2015</a:t>
+              <a:t>2/23/2015</a:t>
             </a:fld>
             <a:endParaRPr lang="en-US"/>
           </a:p>
@@ -461,7 +469,7 @@
             <a:fld id="{1D8BD707-D9CF-40AE-B4C6-C98DA3205C09}" type="datetimeFigureOut">
               <a:rPr lang="en-US" smtClean="0"/>
               <a:pPr/>
-              <a:t>2/21/2015</a:t>
+              <a:t>2/23/2015</a:t>
             </a:fld>
             <a:endParaRPr lang="en-US"/>
           </a:p>
@@ -638,7 +646,7 @@
             <a:fld id="{1D8BD707-D9CF-40AE-B4C6-C98DA3205C09}" type="datetimeFigureOut">
               <a:rPr lang="en-US" smtClean="0"/>
               <a:pPr/>
-              <a:t>2/21/2015</a:t>
+              <a:t>2/23/2015</a:t>
             </a:fld>
             <a:endParaRPr lang="en-US"/>
           </a:p>
@@ -805,7 +813,7 @@
             <a:fld id="{1D8BD707-D9CF-40AE-B4C6-C98DA3205C09}" type="datetimeFigureOut">
               <a:rPr lang="en-US" smtClean="0"/>
               <a:pPr/>
-              <a:t>2/21/2015</a:t>
+              <a:t>2/23/2015</a:t>
             </a:fld>
             <a:endParaRPr lang="en-US"/>
           </a:p>
@@ -1048,7 +1056,7 @@
             <a:fld id="{1D8BD707-D9CF-40AE-B4C6-C98DA3205C09}" type="datetimeFigureOut">
               <a:rPr lang="en-US" smtClean="0"/>
               <a:pPr/>
-              <a:t>2/21/2015</a:t>
+              <a:t>2/23/2015</a:t>
             </a:fld>
             <a:endParaRPr lang="en-US"/>
           </a:p>
@@ -1333,7 +1341,7 @@
             <a:fld id="{1D8BD707-D9CF-40AE-B4C6-C98DA3205C09}" type="datetimeFigureOut">
               <a:rPr lang="en-US" smtClean="0"/>
               <a:pPr/>
-              <a:t>2/21/2015</a:t>
+              <a:t>2/23/2015</a:t>
             </a:fld>
             <a:endParaRPr lang="en-US"/>
           </a:p>
@@ -1752,7 +1760,7 @@
             <a:fld id="{1D8BD707-D9CF-40AE-B4C6-C98DA3205C09}" type="datetimeFigureOut">
               <a:rPr lang="en-US" smtClean="0"/>
               <a:pPr/>
-              <a:t>2/21/2015</a:t>
+              <a:t>2/23/2015</a:t>
             </a:fld>
             <a:endParaRPr lang="en-US"/>
           </a:p>
@@ -1867,7 +1875,7 @@
             <a:fld id="{1D8BD707-D9CF-40AE-B4C6-C98DA3205C09}" type="datetimeFigureOut">
               <a:rPr lang="en-US" smtClean="0"/>
               <a:pPr/>
-              <a:t>2/21/2015</a:t>
+              <a:t>2/23/2015</a:t>
             </a:fld>
             <a:endParaRPr lang="en-US"/>
           </a:p>
@@ -1959,7 +1967,7 @@
             <a:fld id="{1D8BD707-D9CF-40AE-B4C6-C98DA3205C09}" type="datetimeFigureOut">
               <a:rPr lang="en-US" smtClean="0"/>
               <a:pPr/>
-              <a:t>2/21/2015</a:t>
+              <a:t>2/23/2015</a:t>
             </a:fld>
             <a:endParaRPr lang="en-US"/>
           </a:p>
@@ -2233,7 +2241,7 @@
             <a:fld id="{1D8BD707-D9CF-40AE-B4C6-C98DA3205C09}" type="datetimeFigureOut">
               <a:rPr lang="en-US" smtClean="0"/>
               <a:pPr/>
-              <a:t>2/21/2015</a:t>
+              <a:t>2/23/2015</a:t>
             </a:fld>
             <a:endParaRPr lang="en-US"/>
           </a:p>
@@ -2483,7 +2491,7 @@
             <a:fld id="{1D8BD707-D9CF-40AE-B4C6-C98DA3205C09}" type="datetimeFigureOut">
               <a:rPr lang="en-US" smtClean="0"/>
               <a:pPr/>
-              <a:t>2/21/2015</a:t>
+              <a:t>2/23/2015</a:t>
             </a:fld>
             <a:endParaRPr lang="en-US"/>
           </a:p>
@@ -2693,7 +2701,7 @@
             <a:fld id="{1D8BD707-D9CF-40AE-B4C6-C98DA3205C09}" type="datetimeFigureOut">
               <a:rPr lang="en-US" smtClean="0"/>
               <a:pPr/>
-              <a:t>2/21/2015</a:t>
+              <a:t>2/23/2015</a:t>
             </a:fld>
             <a:endParaRPr lang="en-US"/>
           </a:p>
@@ -3115,298 +3123,7 @@
 </p:sld>
 </file>
 
-<file path=ppt/slides/slide2.xml><?xml version="1.0" encoding="utf-8"?>
-<p:sld xmlns:a="http://schemas.openxmlformats.org/drawingml/2006/main" xmlns:r="http://schemas.openxmlformats.org/officeDocument/2006/relationships" xmlns:p="http://schemas.openxmlformats.org/presentationml/2006/main">
-  <p:cSld>
-    <p:spTree>
-      <p:nvGrpSpPr>
-        <p:cNvPr id="1" name=""/>
-        <p:cNvGrpSpPr/>
-        <p:nvPr/>
-      </p:nvGrpSpPr>
-      <p:grpSpPr>
-        <a:xfrm>
-          <a:off x="0" y="0"/>
-          <a:ext cx="0" cy="0"/>
-          <a:chOff x="0" y="0"/>
-          <a:chExt cx="0" cy="0"/>
-        </a:xfrm>
-      </p:grpSpPr>
-      <p:sp>
-        <p:nvSpPr>
-          <p:cNvPr id="2" name="Title 1"/>
-          <p:cNvSpPr>
-            <a:spLocks noGrp="1"/>
-          </p:cNvSpPr>
-          <p:nvPr>
-            <p:ph type="title"/>
-          </p:nvPr>
-        </p:nvSpPr>
-        <p:spPr/>
-        <p:txBody>
-          <a:bodyPr/>
-          <a:lstStyle/>
-          <a:p>
-            <a:r>
-              <a:rPr lang="en-US" dirty="0" smtClean="0"/>
-              <a:t>Outline</a:t>
-            </a:r>
-            <a:endParaRPr lang="en-US" dirty="0"/>
-          </a:p>
-        </p:txBody>
-      </p:sp>
-      <p:sp>
-        <p:nvSpPr>
-          <p:cNvPr id="3" name="Content Placeholder 2"/>
-          <p:cNvSpPr>
-            <a:spLocks noGrp="1"/>
-          </p:cNvSpPr>
-          <p:nvPr>
-            <p:ph idx="1"/>
-          </p:nvPr>
-        </p:nvSpPr>
-        <p:spPr/>
-        <p:txBody>
-          <a:bodyPr>
-            <a:normAutofit fontScale="92500" lnSpcReduction="20000"/>
-          </a:bodyPr>
-          <a:lstStyle/>
-          <a:p>
-            <a:r>
-              <a:rPr lang="en-US" dirty="0" smtClean="0"/>
-              <a:t>Question</a:t>
-            </a:r>
-          </a:p>
-          <a:p>
-            <a:r>
-              <a:rPr lang="en-US" dirty="0" smtClean="0"/>
-              <a:t>Data Overview</a:t>
-            </a:r>
-          </a:p>
-          <a:p>
-            <a:pPr lvl="1"/>
-            <a:r>
-              <a:rPr lang="en-US" dirty="0" smtClean="0"/>
-              <a:t>Data frame:</a:t>
-            </a:r>
-          </a:p>
-          <a:p>
-            <a:r>
-              <a:rPr lang="en-US" dirty="0" smtClean="0"/>
-              <a:t>Metric Development: what is a ‘good’ prediction?</a:t>
-            </a:r>
-          </a:p>
-          <a:p>
-            <a:r>
-              <a:rPr lang="en-US" dirty="0" smtClean="0"/>
-              <a:t>Evaluation:</a:t>
-            </a:r>
-          </a:p>
-          <a:p>
-            <a:pPr lvl="1"/>
-            <a:r>
-              <a:rPr lang="en-US" dirty="0" smtClean="0"/>
-              <a:t>Approach</a:t>
-            </a:r>
-          </a:p>
-          <a:p>
-            <a:pPr lvl="1"/>
-            <a:r>
-              <a:rPr lang="en-US" dirty="0" smtClean="0"/>
-              <a:t>Results</a:t>
-            </a:r>
-          </a:p>
-          <a:p>
-            <a:r>
-              <a:rPr lang="en-US" dirty="0" smtClean="0"/>
-              <a:t>Improvement</a:t>
-            </a:r>
-          </a:p>
-          <a:p>
-            <a:pPr lvl="1"/>
-            <a:r>
-              <a:rPr lang="en-US" dirty="0" smtClean="0"/>
-              <a:t>Training variables</a:t>
-            </a:r>
-          </a:p>
-          <a:p>
-            <a:pPr lvl="1"/>
-            <a:r>
-              <a:rPr lang="en-US" dirty="0" smtClean="0"/>
-              <a:t>Results</a:t>
-            </a:r>
-            <a:endParaRPr lang="en-US" dirty="0"/>
-          </a:p>
-        </p:txBody>
-      </p:sp>
-    </p:spTree>
-    <p:extLst>
-      <p:ext uri="{BB962C8B-B14F-4D97-AF65-F5344CB8AC3E}">
-        <p14:creationId xmlns:p14="http://schemas.microsoft.com/office/powerpoint/2010/main" val="1279520288"/>
-      </p:ext>
-    </p:extLst>
-  </p:cSld>
-  <p:clrMapOvr>
-    <a:masterClrMapping/>
-  </p:clrMapOvr>
-</p:sld>
-</file>
-
-<file path=ppt/slides/slide3.xml><?xml version="1.0" encoding="utf-8"?>
-<p:sld xmlns:a="http://schemas.openxmlformats.org/drawingml/2006/main" xmlns:r="http://schemas.openxmlformats.org/officeDocument/2006/relationships" xmlns:p="http://schemas.openxmlformats.org/presentationml/2006/main">
-  <p:cSld>
-    <p:spTree>
-      <p:nvGrpSpPr>
-        <p:cNvPr id="1" name=""/>
-        <p:cNvGrpSpPr/>
-        <p:nvPr/>
-      </p:nvGrpSpPr>
-      <p:grpSpPr>
-        <a:xfrm>
-          <a:off x="0" y="0"/>
-          <a:ext cx="0" cy="0"/>
-          <a:chOff x="0" y="0"/>
-          <a:chExt cx="0" cy="0"/>
-        </a:xfrm>
-      </p:grpSpPr>
-      <p:sp>
-        <p:nvSpPr>
-          <p:cNvPr id="2" name="Title 1"/>
-          <p:cNvSpPr>
-            <a:spLocks noGrp="1"/>
-          </p:cNvSpPr>
-          <p:nvPr>
-            <p:ph type="title"/>
-          </p:nvPr>
-        </p:nvSpPr>
-        <p:spPr/>
-        <p:txBody>
-          <a:bodyPr/>
-          <a:lstStyle/>
-          <a:p>
-            <a:r>
-              <a:rPr lang="en-US" dirty="0" smtClean="0"/>
-              <a:t>Background</a:t>
-            </a:r>
-            <a:endParaRPr lang="en-US" dirty="0"/>
-          </a:p>
-        </p:txBody>
-      </p:sp>
-      <p:sp>
-        <p:nvSpPr>
-          <p:cNvPr id="3" name="Content Placeholder 2"/>
-          <p:cNvSpPr>
-            <a:spLocks noGrp="1"/>
-          </p:cNvSpPr>
-          <p:nvPr>
-            <p:ph idx="1"/>
-          </p:nvPr>
-        </p:nvSpPr>
-        <p:spPr/>
-        <p:txBody>
-          <a:bodyPr/>
-          <a:lstStyle/>
-          <a:p>
-            <a:r>
-              <a:rPr lang="en-US" dirty="0" smtClean="0"/>
-              <a:t>All buses in Washington Metro Area Transit Authority (WMATA) are tracked by GPS, with information available by API</a:t>
-            </a:r>
-          </a:p>
-          <a:p>
-            <a:r>
-              <a:rPr lang="en-US" dirty="0" smtClean="0"/>
-              <a:t>Bus arrival predictions are available real-time</a:t>
-            </a:r>
-            <a:endParaRPr lang="en-US" dirty="0"/>
-          </a:p>
-        </p:txBody>
-      </p:sp>
-    </p:spTree>
-    <p:extLst>
-      <p:ext uri="{BB962C8B-B14F-4D97-AF65-F5344CB8AC3E}">
-        <p14:creationId xmlns:p14="http://schemas.microsoft.com/office/powerpoint/2010/main" val="2662499524"/>
-      </p:ext>
-    </p:extLst>
-  </p:cSld>
-  <p:clrMapOvr>
-    <a:masterClrMapping/>
-  </p:clrMapOvr>
-</p:sld>
-</file>
-
-<file path=ppt/slides/slide4.xml><?xml version="1.0" encoding="utf-8"?>
-<p:sld xmlns:a="http://schemas.openxmlformats.org/drawingml/2006/main" xmlns:r="http://schemas.openxmlformats.org/officeDocument/2006/relationships" xmlns:p="http://schemas.openxmlformats.org/presentationml/2006/main">
-  <p:cSld>
-    <p:spTree>
-      <p:nvGrpSpPr>
-        <p:cNvPr id="1" name=""/>
-        <p:cNvGrpSpPr/>
-        <p:nvPr/>
-      </p:nvGrpSpPr>
-      <p:grpSpPr>
-        <a:xfrm>
-          <a:off x="0" y="0"/>
-          <a:ext cx="0" cy="0"/>
-          <a:chOff x="0" y="0"/>
-          <a:chExt cx="0" cy="0"/>
-        </a:xfrm>
-      </p:grpSpPr>
-      <p:sp>
-        <p:nvSpPr>
-          <p:cNvPr id="2" name="Title 1"/>
-          <p:cNvSpPr>
-            <a:spLocks noGrp="1"/>
-          </p:cNvSpPr>
-          <p:nvPr>
-            <p:ph type="title"/>
-          </p:nvPr>
-        </p:nvSpPr>
-        <p:spPr/>
-        <p:txBody>
-          <a:bodyPr/>
-          <a:lstStyle/>
-          <a:p>
-            <a:r>
-              <a:rPr lang="en-US" dirty="0" smtClean="0"/>
-              <a:t>Question</a:t>
-            </a:r>
-            <a:endParaRPr lang="en-US" dirty="0"/>
-          </a:p>
-        </p:txBody>
-      </p:sp>
-      <p:sp>
-        <p:nvSpPr>
-          <p:cNvPr id="3" name="Content Placeholder 2"/>
-          <p:cNvSpPr>
-            <a:spLocks noGrp="1"/>
-          </p:cNvSpPr>
-          <p:nvPr>
-            <p:ph idx="1"/>
-          </p:nvPr>
-        </p:nvSpPr>
-        <p:spPr/>
-        <p:txBody>
-          <a:bodyPr/>
-          <a:lstStyle/>
-          <a:p>
-            <a:endParaRPr lang="en-US"/>
-          </a:p>
-        </p:txBody>
-      </p:sp>
-    </p:spTree>
-    <p:extLst>
-      <p:ext uri="{BB962C8B-B14F-4D97-AF65-F5344CB8AC3E}">
-        <p14:creationId xmlns:p14="http://schemas.microsoft.com/office/powerpoint/2010/main" val="3384454449"/>
-      </p:ext>
-    </p:extLst>
-  </p:cSld>
-  <p:clrMapOvr>
-    <a:masterClrMapping/>
-  </p:clrMapOvr>
-</p:sld>
-</file>
-
-<file path=ppt/slides/slide5.xml><?xml version="1.0" encoding="utf-8"?>
+<file path=ppt/slides/slide10.xml><?xml version="1.0" encoding="utf-8"?>
 <p:sld xmlns:a="http://schemas.openxmlformats.org/drawingml/2006/main" xmlns:r="http://schemas.openxmlformats.org/officeDocument/2006/relationships" xmlns:p="http://schemas.openxmlformats.org/presentationml/2006/main">
   <p:cSld>
     <p:spTree>
@@ -3515,6 +3232,717 @@
 </p:sld>
 </file>
 
+<file path=ppt/slides/slide11.xml><?xml version="1.0" encoding="utf-8"?>
+<p:sld xmlns:a="http://schemas.openxmlformats.org/drawingml/2006/main" xmlns:r="http://schemas.openxmlformats.org/officeDocument/2006/relationships" xmlns:p="http://schemas.openxmlformats.org/presentationml/2006/main">
+  <p:cSld>
+    <p:spTree>
+      <p:nvGrpSpPr>
+        <p:cNvPr id="1" name=""/>
+        <p:cNvGrpSpPr/>
+        <p:nvPr/>
+      </p:nvGrpSpPr>
+      <p:grpSpPr>
+        <a:xfrm>
+          <a:off x="0" y="0"/>
+          <a:ext cx="0" cy="0"/>
+          <a:chOff x="0" y="0"/>
+          <a:chExt cx="0" cy="0"/>
+        </a:xfrm>
+      </p:grpSpPr>
+      <p:sp>
+        <p:nvSpPr>
+          <p:cNvPr id="2" name="Title 1"/>
+          <p:cNvSpPr>
+            <a:spLocks noGrp="1"/>
+          </p:cNvSpPr>
+          <p:nvPr>
+            <p:ph type="title"/>
+          </p:nvPr>
+        </p:nvSpPr>
+        <p:spPr/>
+        <p:txBody>
+          <a:bodyPr/>
+          <a:lstStyle/>
+          <a:p>
+            <a:r>
+              <a:rPr lang="en-US" dirty="0" smtClean="0"/>
+              <a:t>Method: Estimating Arrivals</a:t>
+            </a:r>
+            <a:endParaRPr lang="en-US" dirty="0"/>
+          </a:p>
+        </p:txBody>
+      </p:sp>
+      <p:sp>
+        <p:nvSpPr>
+          <p:cNvPr id="3" name="Content Placeholder 2"/>
+          <p:cNvSpPr>
+            <a:spLocks noGrp="1"/>
+          </p:cNvSpPr>
+          <p:nvPr>
+            <p:ph idx="1"/>
+          </p:nvPr>
+        </p:nvSpPr>
+        <p:spPr/>
+        <p:txBody>
+          <a:bodyPr/>
+          <a:lstStyle/>
+          <a:p>
+            <a:r>
+              <a:rPr lang="en-US" dirty="0" smtClean="0"/>
+              <a:t>After you have a big database of predictions, identify arrivals</a:t>
+            </a:r>
+          </a:p>
+          <a:p>
+            <a:r>
+              <a:rPr lang="en-US" dirty="0" smtClean="0"/>
+              <a:t>2 possible methods</a:t>
+            </a:r>
+          </a:p>
+          <a:p>
+            <a:pPr lvl="1"/>
+            <a:r>
+              <a:rPr lang="en-US" dirty="0" smtClean="0"/>
+              <a:t>Predicted arrival = 0</a:t>
+            </a:r>
+          </a:p>
+          <a:p>
+            <a:pPr lvl="1"/>
+            <a:r>
+              <a:rPr lang="en-US" dirty="0" err="1" smtClean="0"/>
+              <a:t>Lat</a:t>
+            </a:r>
+            <a:r>
+              <a:rPr lang="en-US" smtClean="0"/>
+              <a:t>/Lon check</a:t>
+            </a:r>
+            <a:endParaRPr lang="en-US" dirty="0"/>
+          </a:p>
+        </p:txBody>
+      </p:sp>
+    </p:spTree>
+    <p:extLst>
+      <p:ext uri="{BB962C8B-B14F-4D97-AF65-F5344CB8AC3E}">
+        <p14:creationId xmlns:p14="http://schemas.microsoft.com/office/powerpoint/2010/main" val="3249535175"/>
+      </p:ext>
+    </p:extLst>
+  </p:cSld>
+  <p:clrMapOvr>
+    <a:masterClrMapping/>
+  </p:clrMapOvr>
+</p:sld>
+</file>
+
+<file path=ppt/slides/slide12.xml><?xml version="1.0" encoding="utf-8"?>
+<p:sld xmlns:a="http://schemas.openxmlformats.org/drawingml/2006/main" xmlns:r="http://schemas.openxmlformats.org/officeDocument/2006/relationships" xmlns:p="http://schemas.openxmlformats.org/presentationml/2006/main">
+  <p:cSld>
+    <p:spTree>
+      <p:nvGrpSpPr>
+        <p:cNvPr id="1" name=""/>
+        <p:cNvGrpSpPr/>
+        <p:nvPr/>
+      </p:nvGrpSpPr>
+      <p:grpSpPr>
+        <a:xfrm>
+          <a:off x="0" y="0"/>
+          <a:ext cx="0" cy="0"/>
+          <a:chOff x="0" y="0"/>
+          <a:chExt cx="0" cy="0"/>
+        </a:xfrm>
+      </p:grpSpPr>
+      <p:sp>
+        <p:nvSpPr>
+          <p:cNvPr id="2" name="Title 1"/>
+          <p:cNvSpPr>
+            <a:spLocks noGrp="1"/>
+          </p:cNvSpPr>
+          <p:nvPr>
+            <p:ph type="title"/>
+          </p:nvPr>
+        </p:nvSpPr>
+        <p:spPr/>
+        <p:txBody>
+          <a:bodyPr/>
+          <a:lstStyle/>
+          <a:p>
+            <a:r>
+              <a:rPr lang="en-US" dirty="0" smtClean="0"/>
+              <a:t>Data Collection Overview</a:t>
+            </a:r>
+            <a:endParaRPr lang="en-US" dirty="0"/>
+          </a:p>
+        </p:txBody>
+      </p:sp>
+      <p:sp>
+        <p:nvSpPr>
+          <p:cNvPr id="3" name="Content Placeholder 2"/>
+          <p:cNvSpPr>
+            <a:spLocks noGrp="1"/>
+          </p:cNvSpPr>
+          <p:nvPr>
+            <p:ph idx="1"/>
+          </p:nvPr>
+        </p:nvSpPr>
+        <p:spPr/>
+        <p:txBody>
+          <a:bodyPr/>
+          <a:lstStyle/>
+          <a:p>
+            <a:r>
+              <a:rPr lang="en-US" dirty="0" smtClean="0"/>
+              <a:t>Calls per day needed</a:t>
+            </a:r>
+            <a:endParaRPr lang="en-US" dirty="0"/>
+          </a:p>
+        </p:txBody>
+      </p:sp>
+    </p:spTree>
+    <p:extLst>
+      <p:ext uri="{BB962C8B-B14F-4D97-AF65-F5344CB8AC3E}">
+        <p14:creationId xmlns:p14="http://schemas.microsoft.com/office/powerpoint/2010/main" val="4163241437"/>
+      </p:ext>
+    </p:extLst>
+  </p:cSld>
+  <p:clrMapOvr>
+    <a:masterClrMapping/>
+  </p:clrMapOvr>
+</p:sld>
+</file>
+
+<file path=ppt/slides/slide13.xml><?xml version="1.0" encoding="utf-8"?>
+<p:sld xmlns:a="http://schemas.openxmlformats.org/drawingml/2006/main" xmlns:r="http://schemas.openxmlformats.org/officeDocument/2006/relationships" xmlns:p="http://schemas.openxmlformats.org/presentationml/2006/main">
+  <p:cSld>
+    <p:spTree>
+      <p:nvGrpSpPr>
+        <p:cNvPr id="1" name=""/>
+        <p:cNvGrpSpPr/>
+        <p:nvPr/>
+      </p:nvGrpSpPr>
+      <p:grpSpPr>
+        <a:xfrm>
+          <a:off x="0" y="0"/>
+          <a:ext cx="0" cy="0"/>
+          <a:chOff x="0" y="0"/>
+          <a:chExt cx="0" cy="0"/>
+        </a:xfrm>
+      </p:grpSpPr>
+      <p:sp>
+        <p:nvSpPr>
+          <p:cNvPr id="2" name="Title 1"/>
+          <p:cNvSpPr>
+            <a:spLocks noGrp="1"/>
+          </p:cNvSpPr>
+          <p:nvPr>
+            <p:ph type="title"/>
+          </p:nvPr>
+        </p:nvSpPr>
+        <p:spPr/>
+        <p:txBody>
+          <a:bodyPr/>
+          <a:lstStyle/>
+          <a:p>
+            <a:r>
+              <a:rPr lang="en-US" dirty="0" smtClean="0"/>
+              <a:t>Results: </a:t>
+            </a:r>
+            <a:r>
+              <a:rPr lang="en-US" dirty="0" err="1" smtClean="0"/>
+              <a:t>NextBus</a:t>
+            </a:r>
+            <a:r>
+              <a:rPr lang="en-US" dirty="0" smtClean="0"/>
+              <a:t> Performance</a:t>
+            </a:r>
+            <a:endParaRPr lang="en-US" dirty="0"/>
+          </a:p>
+        </p:txBody>
+      </p:sp>
+      <p:sp>
+        <p:nvSpPr>
+          <p:cNvPr id="3" name="Content Placeholder 2"/>
+          <p:cNvSpPr>
+            <a:spLocks noGrp="1"/>
+          </p:cNvSpPr>
+          <p:nvPr>
+            <p:ph idx="1"/>
+          </p:nvPr>
+        </p:nvSpPr>
+        <p:spPr/>
+        <p:txBody>
+          <a:bodyPr/>
+          <a:lstStyle/>
+          <a:p>
+            <a:endParaRPr lang="en-US"/>
+          </a:p>
+        </p:txBody>
+      </p:sp>
+    </p:spTree>
+    <p:extLst>
+      <p:ext uri="{BB962C8B-B14F-4D97-AF65-F5344CB8AC3E}">
+        <p14:creationId xmlns:p14="http://schemas.microsoft.com/office/powerpoint/2010/main" val="2538024004"/>
+      </p:ext>
+    </p:extLst>
+  </p:cSld>
+  <p:clrMapOvr>
+    <a:masterClrMapping/>
+  </p:clrMapOvr>
+</p:sld>
+</file>
+
+<file path=ppt/slides/slide14.xml><?xml version="1.0" encoding="utf-8"?>
+<p:sld xmlns:a="http://schemas.openxmlformats.org/drawingml/2006/main" xmlns:r="http://schemas.openxmlformats.org/officeDocument/2006/relationships" xmlns:p="http://schemas.openxmlformats.org/presentationml/2006/main">
+  <p:cSld>
+    <p:spTree>
+      <p:nvGrpSpPr>
+        <p:cNvPr id="1" name=""/>
+        <p:cNvGrpSpPr/>
+        <p:nvPr/>
+      </p:nvGrpSpPr>
+      <p:grpSpPr>
+        <a:xfrm>
+          <a:off x="0" y="0"/>
+          <a:ext cx="0" cy="0"/>
+          <a:chOff x="0" y="0"/>
+          <a:chExt cx="0" cy="0"/>
+        </a:xfrm>
+      </p:grpSpPr>
+      <p:sp>
+        <p:nvSpPr>
+          <p:cNvPr id="2" name="Title 1"/>
+          <p:cNvSpPr>
+            <a:spLocks noGrp="1"/>
+          </p:cNvSpPr>
+          <p:nvPr>
+            <p:ph type="title"/>
+          </p:nvPr>
+        </p:nvSpPr>
+        <p:spPr/>
+        <p:txBody>
+          <a:bodyPr/>
+          <a:lstStyle/>
+          <a:p>
+            <a:r>
+              <a:rPr lang="en-US" dirty="0" smtClean="0"/>
+              <a:t>Improvement: Training Variables</a:t>
+            </a:r>
+            <a:endParaRPr lang="en-US" dirty="0"/>
+          </a:p>
+        </p:txBody>
+      </p:sp>
+      <p:sp>
+        <p:nvSpPr>
+          <p:cNvPr id="3" name="Content Placeholder 2"/>
+          <p:cNvSpPr>
+            <a:spLocks noGrp="1"/>
+          </p:cNvSpPr>
+          <p:nvPr>
+            <p:ph idx="1"/>
+          </p:nvPr>
+        </p:nvSpPr>
+        <p:spPr/>
+        <p:txBody>
+          <a:bodyPr/>
+          <a:lstStyle/>
+          <a:p>
+            <a:r>
+              <a:rPr lang="en-US" dirty="0" smtClean="0"/>
+              <a:t>Try: time of day, day of week, bus ID (as a proxy for driver), temperature (as a proxy for weather?), location, stop ID</a:t>
+            </a:r>
+          </a:p>
+          <a:p>
+            <a:r>
+              <a:rPr lang="en-US" dirty="0" smtClean="0"/>
+              <a:t>Also create dummy versions: ‘rush hour?’, ‘week day?’, ‘bad weather?’, ‘downtown?’</a:t>
+            </a:r>
+            <a:endParaRPr lang="en-US" dirty="0"/>
+          </a:p>
+        </p:txBody>
+      </p:sp>
+    </p:spTree>
+    <p:extLst>
+      <p:ext uri="{BB962C8B-B14F-4D97-AF65-F5344CB8AC3E}">
+        <p14:creationId xmlns:p14="http://schemas.microsoft.com/office/powerpoint/2010/main" val="592066402"/>
+      </p:ext>
+    </p:extLst>
+  </p:cSld>
+  <p:clrMapOvr>
+    <a:masterClrMapping/>
+  </p:clrMapOvr>
+</p:sld>
+</file>
+
+<file path=ppt/slides/slide2.xml><?xml version="1.0" encoding="utf-8"?>
+<p:sld xmlns:a="http://schemas.openxmlformats.org/drawingml/2006/main" xmlns:r="http://schemas.openxmlformats.org/officeDocument/2006/relationships" xmlns:p="http://schemas.openxmlformats.org/presentationml/2006/main">
+  <p:cSld>
+    <p:spTree>
+      <p:nvGrpSpPr>
+        <p:cNvPr id="1" name=""/>
+        <p:cNvGrpSpPr/>
+        <p:nvPr/>
+      </p:nvGrpSpPr>
+      <p:grpSpPr>
+        <a:xfrm>
+          <a:off x="0" y="0"/>
+          <a:ext cx="0" cy="0"/>
+          <a:chOff x="0" y="0"/>
+          <a:chExt cx="0" cy="0"/>
+        </a:xfrm>
+      </p:grpSpPr>
+      <p:sp>
+        <p:nvSpPr>
+          <p:cNvPr id="2" name="Title 1"/>
+          <p:cNvSpPr>
+            <a:spLocks noGrp="1"/>
+          </p:cNvSpPr>
+          <p:nvPr>
+            <p:ph type="title"/>
+          </p:nvPr>
+        </p:nvSpPr>
+        <p:spPr/>
+        <p:txBody>
+          <a:bodyPr/>
+          <a:lstStyle/>
+          <a:p>
+            <a:r>
+              <a:rPr lang="en-US" dirty="0" smtClean="0"/>
+              <a:t>Outline</a:t>
+            </a:r>
+            <a:endParaRPr lang="en-US" dirty="0"/>
+          </a:p>
+        </p:txBody>
+      </p:sp>
+      <p:sp>
+        <p:nvSpPr>
+          <p:cNvPr id="3" name="Content Placeholder 2"/>
+          <p:cNvSpPr>
+            <a:spLocks noGrp="1"/>
+          </p:cNvSpPr>
+          <p:nvPr>
+            <p:ph idx="1"/>
+          </p:nvPr>
+        </p:nvSpPr>
+        <p:spPr/>
+        <p:txBody>
+          <a:bodyPr>
+            <a:normAutofit fontScale="92500" lnSpcReduction="20000"/>
+          </a:bodyPr>
+          <a:lstStyle/>
+          <a:p>
+            <a:r>
+              <a:rPr lang="en-US" dirty="0" smtClean="0"/>
+              <a:t>Question</a:t>
+            </a:r>
+          </a:p>
+          <a:p>
+            <a:r>
+              <a:rPr lang="en-US" dirty="0" smtClean="0"/>
+              <a:t>Data Overview</a:t>
+            </a:r>
+          </a:p>
+          <a:p>
+            <a:pPr lvl="1"/>
+            <a:r>
+              <a:rPr lang="en-US" dirty="0" smtClean="0"/>
+              <a:t>Data frame:</a:t>
+            </a:r>
+          </a:p>
+          <a:p>
+            <a:r>
+              <a:rPr lang="en-US" dirty="0" smtClean="0"/>
+              <a:t>Metric Development: what is a ‘good’ prediction?</a:t>
+            </a:r>
+          </a:p>
+          <a:p>
+            <a:r>
+              <a:rPr lang="en-US" dirty="0" smtClean="0"/>
+              <a:t>Evaluation:</a:t>
+            </a:r>
+          </a:p>
+          <a:p>
+            <a:pPr lvl="1"/>
+            <a:r>
+              <a:rPr lang="en-US" dirty="0" smtClean="0"/>
+              <a:t>Approach</a:t>
+            </a:r>
+          </a:p>
+          <a:p>
+            <a:pPr lvl="1"/>
+            <a:r>
+              <a:rPr lang="en-US" dirty="0" smtClean="0"/>
+              <a:t>Results</a:t>
+            </a:r>
+          </a:p>
+          <a:p>
+            <a:r>
+              <a:rPr lang="en-US" dirty="0" smtClean="0"/>
+              <a:t>Improvement</a:t>
+            </a:r>
+          </a:p>
+          <a:p>
+            <a:pPr lvl="1"/>
+            <a:r>
+              <a:rPr lang="en-US" dirty="0" smtClean="0"/>
+              <a:t>Training variables</a:t>
+            </a:r>
+          </a:p>
+          <a:p>
+            <a:pPr lvl="1"/>
+            <a:r>
+              <a:rPr lang="en-US" dirty="0" smtClean="0"/>
+              <a:t>Results</a:t>
+            </a:r>
+            <a:endParaRPr lang="en-US" dirty="0"/>
+          </a:p>
+        </p:txBody>
+      </p:sp>
+    </p:spTree>
+    <p:extLst>
+      <p:ext uri="{BB962C8B-B14F-4D97-AF65-F5344CB8AC3E}">
+        <p14:creationId xmlns:p14="http://schemas.microsoft.com/office/powerpoint/2010/main" val="1279520288"/>
+      </p:ext>
+    </p:extLst>
+  </p:cSld>
+  <p:clrMapOvr>
+    <a:masterClrMapping/>
+  </p:clrMapOvr>
+</p:sld>
+</file>
+
+<file path=ppt/slides/slide3.xml><?xml version="1.0" encoding="utf-8"?>
+<p:sld xmlns:a="http://schemas.openxmlformats.org/drawingml/2006/main" xmlns:r="http://schemas.openxmlformats.org/officeDocument/2006/relationships" xmlns:p="http://schemas.openxmlformats.org/presentationml/2006/main">
+  <p:cSld>
+    <p:spTree>
+      <p:nvGrpSpPr>
+        <p:cNvPr id="1" name=""/>
+        <p:cNvGrpSpPr/>
+        <p:nvPr/>
+      </p:nvGrpSpPr>
+      <p:grpSpPr>
+        <a:xfrm>
+          <a:off x="0" y="0"/>
+          <a:ext cx="0" cy="0"/>
+          <a:chOff x="0" y="0"/>
+          <a:chExt cx="0" cy="0"/>
+        </a:xfrm>
+      </p:grpSpPr>
+      <p:sp>
+        <p:nvSpPr>
+          <p:cNvPr id="2" name="Title 1"/>
+          <p:cNvSpPr>
+            <a:spLocks noGrp="1"/>
+          </p:cNvSpPr>
+          <p:nvPr>
+            <p:ph type="title"/>
+          </p:nvPr>
+        </p:nvSpPr>
+        <p:spPr/>
+        <p:txBody>
+          <a:bodyPr/>
+          <a:lstStyle/>
+          <a:p>
+            <a:r>
+              <a:rPr lang="en-US" dirty="0" smtClean="0"/>
+              <a:t>Open Transit Data</a:t>
+            </a:r>
+            <a:endParaRPr lang="en-US" dirty="0"/>
+          </a:p>
+        </p:txBody>
+      </p:sp>
+      <p:sp>
+        <p:nvSpPr>
+          <p:cNvPr id="3" name="Content Placeholder 2"/>
+          <p:cNvSpPr>
+            <a:spLocks noGrp="1"/>
+          </p:cNvSpPr>
+          <p:nvPr>
+            <p:ph idx="1"/>
+          </p:nvPr>
+        </p:nvSpPr>
+        <p:spPr/>
+        <p:txBody>
+          <a:bodyPr/>
+          <a:lstStyle/>
+          <a:p>
+            <a:endParaRPr lang="en-US"/>
+          </a:p>
+        </p:txBody>
+      </p:sp>
+    </p:spTree>
+    <p:extLst>
+      <p:ext uri="{BB962C8B-B14F-4D97-AF65-F5344CB8AC3E}">
+        <p14:creationId xmlns:p14="http://schemas.microsoft.com/office/powerpoint/2010/main" val="3435552009"/>
+      </p:ext>
+    </p:extLst>
+  </p:cSld>
+  <p:clrMapOvr>
+    <a:masterClrMapping/>
+  </p:clrMapOvr>
+</p:sld>
+</file>
+
+<file path=ppt/slides/slide4.xml><?xml version="1.0" encoding="utf-8"?>
+<p:sld xmlns:a="http://schemas.openxmlformats.org/drawingml/2006/main" xmlns:r="http://schemas.openxmlformats.org/officeDocument/2006/relationships" xmlns:p="http://schemas.openxmlformats.org/presentationml/2006/main">
+  <p:cSld>
+    <p:spTree>
+      <p:nvGrpSpPr>
+        <p:cNvPr id="1" name=""/>
+        <p:cNvGrpSpPr/>
+        <p:nvPr/>
+      </p:nvGrpSpPr>
+      <p:grpSpPr>
+        <a:xfrm>
+          <a:off x="0" y="0"/>
+          <a:ext cx="0" cy="0"/>
+          <a:chOff x="0" y="0"/>
+          <a:chExt cx="0" cy="0"/>
+        </a:xfrm>
+      </p:grpSpPr>
+      <p:sp>
+        <p:nvSpPr>
+          <p:cNvPr id="2" name="Title 1"/>
+          <p:cNvSpPr>
+            <a:spLocks noGrp="1"/>
+          </p:cNvSpPr>
+          <p:nvPr>
+            <p:ph type="title"/>
+          </p:nvPr>
+        </p:nvSpPr>
+        <p:spPr/>
+        <p:txBody>
+          <a:bodyPr/>
+          <a:lstStyle/>
+          <a:p>
+            <a:r>
+              <a:rPr lang="en-US" dirty="0" smtClean="0"/>
+              <a:t>Background</a:t>
+            </a:r>
+            <a:endParaRPr lang="en-US" dirty="0"/>
+          </a:p>
+        </p:txBody>
+      </p:sp>
+      <p:sp>
+        <p:nvSpPr>
+          <p:cNvPr id="3" name="Content Placeholder 2"/>
+          <p:cNvSpPr>
+            <a:spLocks noGrp="1"/>
+          </p:cNvSpPr>
+          <p:nvPr>
+            <p:ph idx="1"/>
+          </p:nvPr>
+        </p:nvSpPr>
+        <p:spPr/>
+        <p:txBody>
+          <a:bodyPr/>
+          <a:lstStyle/>
+          <a:p>
+            <a:r>
+              <a:rPr lang="en-US" dirty="0" smtClean="0"/>
+              <a:t>All buses in Washington Metro Area Transit Authority (WMATA) are tracked by GPS, with information available by API</a:t>
+            </a:r>
+          </a:p>
+          <a:p>
+            <a:r>
+              <a:rPr lang="en-US" dirty="0" smtClean="0"/>
+              <a:t>Bus arrival predictions are available </a:t>
+            </a:r>
+            <a:r>
+              <a:rPr lang="en-US" dirty="0" smtClean="0"/>
+              <a:t>real-time</a:t>
+            </a:r>
+          </a:p>
+          <a:p>
+            <a:r>
+              <a:rPr lang="en-US" dirty="0" smtClean="0"/>
+              <a:t>Good bus predictions are likely to improve ridership and user satisfaction</a:t>
+            </a:r>
+            <a:endParaRPr lang="en-US" dirty="0"/>
+          </a:p>
+        </p:txBody>
+      </p:sp>
+    </p:spTree>
+    <p:extLst>
+      <p:ext uri="{BB962C8B-B14F-4D97-AF65-F5344CB8AC3E}">
+        <p14:creationId xmlns:p14="http://schemas.microsoft.com/office/powerpoint/2010/main" val="2662499524"/>
+      </p:ext>
+    </p:extLst>
+  </p:cSld>
+  <p:clrMapOvr>
+    <a:masterClrMapping/>
+  </p:clrMapOvr>
+</p:sld>
+</file>
+
+<file path=ppt/slides/slide5.xml><?xml version="1.0" encoding="utf-8"?>
+<p:sld xmlns:a="http://schemas.openxmlformats.org/drawingml/2006/main" xmlns:r="http://schemas.openxmlformats.org/officeDocument/2006/relationships" xmlns:p="http://schemas.openxmlformats.org/presentationml/2006/main">
+  <p:cSld>
+    <p:spTree>
+      <p:nvGrpSpPr>
+        <p:cNvPr id="1" name=""/>
+        <p:cNvGrpSpPr/>
+        <p:nvPr/>
+      </p:nvGrpSpPr>
+      <p:grpSpPr>
+        <a:xfrm>
+          <a:off x="0" y="0"/>
+          <a:ext cx="0" cy="0"/>
+          <a:chOff x="0" y="0"/>
+          <a:chExt cx="0" cy="0"/>
+        </a:xfrm>
+      </p:grpSpPr>
+      <p:sp>
+        <p:nvSpPr>
+          <p:cNvPr id="2" name="Title 1"/>
+          <p:cNvSpPr>
+            <a:spLocks noGrp="1"/>
+          </p:cNvSpPr>
+          <p:nvPr>
+            <p:ph type="title"/>
+          </p:nvPr>
+        </p:nvSpPr>
+        <p:spPr/>
+        <p:txBody>
+          <a:bodyPr/>
+          <a:lstStyle/>
+          <a:p>
+            <a:r>
+              <a:rPr lang="en-US" dirty="0" smtClean="0"/>
+              <a:t>DC Applications</a:t>
+            </a:r>
+            <a:endParaRPr lang="en-US" dirty="0"/>
+          </a:p>
+        </p:txBody>
+      </p:sp>
+      <p:sp>
+        <p:nvSpPr>
+          <p:cNvPr id="3" name="Content Placeholder 2"/>
+          <p:cNvSpPr>
+            <a:spLocks noGrp="1"/>
+          </p:cNvSpPr>
+          <p:nvPr>
+            <p:ph idx="1"/>
+          </p:nvPr>
+        </p:nvSpPr>
+        <p:spPr/>
+        <p:txBody>
+          <a:bodyPr/>
+          <a:lstStyle/>
+          <a:p>
+            <a:endParaRPr lang="en-US"/>
+          </a:p>
+        </p:txBody>
+      </p:sp>
+    </p:spTree>
+    <p:extLst>
+      <p:ext uri="{BB962C8B-B14F-4D97-AF65-F5344CB8AC3E}">
+        <p14:creationId xmlns:p14="http://schemas.microsoft.com/office/powerpoint/2010/main" val="1854586306"/>
+      </p:ext>
+    </p:extLst>
+  </p:cSld>
+  <p:clrMapOvr>
+    <a:masterClrMapping/>
+  </p:clrMapOvr>
+</p:sld>
+</file>
+
 <file path=ppt/slides/slide6.xml><?xml version="1.0" encoding="utf-8"?>
 <p:sld xmlns:a="http://schemas.openxmlformats.org/drawingml/2006/main" xmlns:r="http://schemas.openxmlformats.org/officeDocument/2006/relationships" xmlns:p="http://schemas.openxmlformats.org/presentationml/2006/main">
   <p:cSld>
@@ -3549,7 +3977,15 @@
           <a:p>
             <a:r>
               <a:rPr lang="en-US" dirty="0" smtClean="0"/>
-              <a:t>Improvement: Training Variables</a:t>
+              <a:t>When </a:t>
+            </a:r>
+            <a:r>
+              <a:rPr lang="en-US" dirty="0" err="1" smtClean="0"/>
+              <a:t>NextBus</a:t>
+            </a:r>
+            <a:r>
+              <a:rPr lang="en-US" dirty="0" smtClean="0"/>
+              <a:t> Goes Wrong</a:t>
             </a:r>
             <a:endParaRPr lang="en-US" dirty="0"/>
           </a:p>
@@ -3572,13 +4008,7 @@
           <a:p>
             <a:r>
               <a:rPr lang="en-US" dirty="0" smtClean="0"/>
-              <a:t>Try: time of day, day of week, bus ID (as a proxy for driver), temperature (as a proxy for weather?), location, stop ID</a:t>
-            </a:r>
-          </a:p>
-          <a:p>
-            <a:r>
-              <a:rPr lang="en-US" dirty="0" smtClean="0"/>
-              <a:t>Also create dummy versions: ‘rush hour?’, ‘week day?’, ‘bad weather?’, ‘downtown?’</a:t>
+              <a:t>A bad prediction can be worse than no prediction</a:t>
             </a:r>
             <a:endParaRPr lang="en-US" dirty="0"/>
           </a:p>
@@ -3587,7 +4017,223 @@
     </p:spTree>
     <p:extLst>
       <p:ext uri="{BB962C8B-B14F-4D97-AF65-F5344CB8AC3E}">
-        <p14:creationId xmlns:p14="http://schemas.microsoft.com/office/powerpoint/2010/main" val="592066402"/>
+        <p14:creationId xmlns:p14="http://schemas.microsoft.com/office/powerpoint/2010/main" val="2242010954"/>
+      </p:ext>
+    </p:extLst>
+  </p:cSld>
+  <p:clrMapOvr>
+    <a:masterClrMapping/>
+  </p:clrMapOvr>
+</p:sld>
+</file>
+
+<file path=ppt/slides/slide7.xml><?xml version="1.0" encoding="utf-8"?>
+<p:sld xmlns:a="http://schemas.openxmlformats.org/drawingml/2006/main" xmlns:r="http://schemas.openxmlformats.org/officeDocument/2006/relationships" xmlns:p="http://schemas.openxmlformats.org/presentationml/2006/main">
+  <p:cSld>
+    <p:spTree>
+      <p:nvGrpSpPr>
+        <p:cNvPr id="1" name=""/>
+        <p:cNvGrpSpPr/>
+        <p:nvPr/>
+      </p:nvGrpSpPr>
+      <p:grpSpPr>
+        <a:xfrm>
+          <a:off x="0" y="0"/>
+          <a:ext cx="0" cy="0"/>
+          <a:chOff x="0" y="0"/>
+          <a:chExt cx="0" cy="0"/>
+        </a:xfrm>
+      </p:grpSpPr>
+      <p:sp>
+        <p:nvSpPr>
+          <p:cNvPr id="2" name="Title 1"/>
+          <p:cNvSpPr>
+            <a:spLocks noGrp="1"/>
+          </p:cNvSpPr>
+          <p:nvPr>
+            <p:ph type="title"/>
+          </p:nvPr>
+        </p:nvSpPr>
+        <p:spPr/>
+        <p:txBody>
+          <a:bodyPr/>
+          <a:lstStyle/>
+          <a:p>
+            <a:r>
+              <a:rPr lang="en-US" dirty="0" smtClean="0"/>
+              <a:t>Question</a:t>
+            </a:r>
+            <a:endParaRPr lang="en-US" dirty="0"/>
+          </a:p>
+        </p:txBody>
+      </p:sp>
+      <p:sp>
+        <p:nvSpPr>
+          <p:cNvPr id="3" name="Content Placeholder 2"/>
+          <p:cNvSpPr>
+            <a:spLocks noGrp="1"/>
+          </p:cNvSpPr>
+          <p:nvPr>
+            <p:ph idx="1"/>
+          </p:nvPr>
+        </p:nvSpPr>
+        <p:spPr/>
+        <p:txBody>
+          <a:bodyPr/>
+          <a:lstStyle/>
+          <a:p>
+            <a:endParaRPr lang="en-US"/>
+          </a:p>
+        </p:txBody>
+      </p:sp>
+    </p:spTree>
+    <p:extLst>
+      <p:ext uri="{BB962C8B-B14F-4D97-AF65-F5344CB8AC3E}">
+        <p14:creationId xmlns:p14="http://schemas.microsoft.com/office/powerpoint/2010/main" val="3384454449"/>
+      </p:ext>
+    </p:extLst>
+  </p:cSld>
+  <p:clrMapOvr>
+    <a:masterClrMapping/>
+  </p:clrMapOvr>
+</p:sld>
+</file>
+
+<file path=ppt/slides/slide8.xml><?xml version="1.0" encoding="utf-8"?>
+<p:sld xmlns:a="http://schemas.openxmlformats.org/drawingml/2006/main" xmlns:r="http://schemas.openxmlformats.org/officeDocument/2006/relationships" xmlns:p="http://schemas.openxmlformats.org/presentationml/2006/main">
+  <p:cSld>
+    <p:spTree>
+      <p:nvGrpSpPr>
+        <p:cNvPr id="1" name=""/>
+        <p:cNvGrpSpPr/>
+        <p:nvPr/>
+      </p:nvGrpSpPr>
+      <p:grpSpPr>
+        <a:xfrm>
+          <a:off x="0" y="0"/>
+          <a:ext cx="0" cy="0"/>
+          <a:chOff x="0" y="0"/>
+          <a:chExt cx="0" cy="0"/>
+        </a:xfrm>
+      </p:grpSpPr>
+      <p:sp>
+        <p:nvSpPr>
+          <p:cNvPr id="2" name="Title 1"/>
+          <p:cNvSpPr>
+            <a:spLocks noGrp="1"/>
+          </p:cNvSpPr>
+          <p:nvPr>
+            <p:ph type="title"/>
+          </p:nvPr>
+        </p:nvSpPr>
+        <p:spPr/>
+        <p:txBody>
+          <a:bodyPr/>
+          <a:lstStyle/>
+          <a:p>
+            <a:r>
+              <a:rPr lang="en-US" dirty="0" smtClean="0"/>
+              <a:t>Data Structure Concept</a:t>
+            </a:r>
+            <a:endParaRPr lang="en-US" dirty="0"/>
+          </a:p>
+        </p:txBody>
+      </p:sp>
+      <p:sp>
+        <p:nvSpPr>
+          <p:cNvPr id="3" name="Content Placeholder 2"/>
+          <p:cNvSpPr>
+            <a:spLocks noGrp="1"/>
+          </p:cNvSpPr>
+          <p:nvPr>
+            <p:ph idx="1"/>
+          </p:nvPr>
+        </p:nvSpPr>
+        <p:spPr/>
+        <p:txBody>
+          <a:bodyPr/>
+          <a:lstStyle/>
+          <a:p>
+            <a:endParaRPr lang="en-US"/>
+          </a:p>
+        </p:txBody>
+      </p:sp>
+    </p:spTree>
+    <p:extLst>
+      <p:ext uri="{BB962C8B-B14F-4D97-AF65-F5344CB8AC3E}">
+        <p14:creationId xmlns:p14="http://schemas.microsoft.com/office/powerpoint/2010/main" val="3473561733"/>
+      </p:ext>
+    </p:extLst>
+  </p:cSld>
+  <p:clrMapOvr>
+    <a:masterClrMapping/>
+  </p:clrMapOvr>
+</p:sld>
+</file>
+
+<file path=ppt/slides/slide9.xml><?xml version="1.0" encoding="utf-8"?>
+<p:sld xmlns:a="http://schemas.openxmlformats.org/drawingml/2006/main" xmlns:r="http://schemas.openxmlformats.org/officeDocument/2006/relationships" xmlns:p="http://schemas.openxmlformats.org/presentationml/2006/main">
+  <p:cSld>
+    <p:spTree>
+      <p:nvGrpSpPr>
+        <p:cNvPr id="1" name=""/>
+        <p:cNvGrpSpPr/>
+        <p:nvPr/>
+      </p:nvGrpSpPr>
+      <p:grpSpPr>
+        <a:xfrm>
+          <a:off x="0" y="0"/>
+          <a:ext cx="0" cy="0"/>
+          <a:chOff x="0" y="0"/>
+          <a:chExt cx="0" cy="0"/>
+        </a:xfrm>
+      </p:grpSpPr>
+      <p:sp>
+        <p:nvSpPr>
+          <p:cNvPr id="2" name="Title 1"/>
+          <p:cNvSpPr>
+            <a:spLocks noGrp="1"/>
+          </p:cNvSpPr>
+          <p:nvPr>
+            <p:ph type="title"/>
+          </p:nvPr>
+        </p:nvSpPr>
+        <p:spPr/>
+        <p:txBody>
+          <a:bodyPr/>
+          <a:lstStyle/>
+          <a:p>
+            <a:r>
+              <a:rPr lang="en-US" dirty="0" smtClean="0"/>
+              <a:t>WMATA APIs</a:t>
+            </a:r>
+            <a:endParaRPr lang="en-US" dirty="0"/>
+          </a:p>
+        </p:txBody>
+      </p:sp>
+      <p:sp>
+        <p:nvSpPr>
+          <p:cNvPr id="3" name="Content Placeholder 2"/>
+          <p:cNvSpPr>
+            <a:spLocks noGrp="1"/>
+          </p:cNvSpPr>
+          <p:nvPr>
+            <p:ph idx="1"/>
+          </p:nvPr>
+        </p:nvSpPr>
+        <p:spPr/>
+        <p:txBody>
+          <a:bodyPr/>
+          <a:lstStyle/>
+          <a:p>
+            <a:endParaRPr lang="en-US"/>
+          </a:p>
+        </p:txBody>
+      </p:sp>
+    </p:spTree>
+    <p:extLst>
+      <p:ext uri="{BB962C8B-B14F-4D97-AF65-F5344CB8AC3E}">
+        <p14:creationId xmlns:p14="http://schemas.microsoft.com/office/powerpoint/2010/main" val="44731535"/>
       </p:ext>
     </p:extLst>
   </p:cSld>

</xml_diff>